<commit_message>
parece que ahora sí
</commit_message>
<xml_diff>
--- a/prototipo-card-validation.pptx
+++ b/prototipo-card-validation.pptx
@@ -266,7 +266,7 @@
           <a:p>
             <a:fld id="{2D727D75-242A-4893-BFA0-CDF26EA27425}" type="datetimeFigureOut">
               <a:rPr lang="es-CL" smtClean="0"/>
-              <a:t>14-04-2023</a:t>
+              <a:t>19-04-2023</a:t>
             </a:fld>
             <a:endParaRPr lang="es-CL"/>
           </a:p>
@@ -466,7 +466,7 @@
           <a:p>
             <a:fld id="{2D727D75-242A-4893-BFA0-CDF26EA27425}" type="datetimeFigureOut">
               <a:rPr lang="es-CL" smtClean="0"/>
-              <a:t>14-04-2023</a:t>
+              <a:t>19-04-2023</a:t>
             </a:fld>
             <a:endParaRPr lang="es-CL"/>
           </a:p>
@@ -676,7 +676,7 @@
           <a:p>
             <a:fld id="{2D727D75-242A-4893-BFA0-CDF26EA27425}" type="datetimeFigureOut">
               <a:rPr lang="es-CL" smtClean="0"/>
-              <a:t>14-04-2023</a:t>
+              <a:t>19-04-2023</a:t>
             </a:fld>
             <a:endParaRPr lang="es-CL"/>
           </a:p>
@@ -876,7 +876,7 @@
           <a:p>
             <a:fld id="{2D727D75-242A-4893-BFA0-CDF26EA27425}" type="datetimeFigureOut">
               <a:rPr lang="es-CL" smtClean="0"/>
-              <a:t>14-04-2023</a:t>
+              <a:t>19-04-2023</a:t>
             </a:fld>
             <a:endParaRPr lang="es-CL"/>
           </a:p>
@@ -1152,7 +1152,7 @@
           <a:p>
             <a:fld id="{2D727D75-242A-4893-BFA0-CDF26EA27425}" type="datetimeFigureOut">
               <a:rPr lang="es-CL" smtClean="0"/>
-              <a:t>14-04-2023</a:t>
+              <a:t>19-04-2023</a:t>
             </a:fld>
             <a:endParaRPr lang="es-CL"/>
           </a:p>
@@ -1420,7 +1420,7 @@
           <a:p>
             <a:fld id="{2D727D75-242A-4893-BFA0-CDF26EA27425}" type="datetimeFigureOut">
               <a:rPr lang="es-CL" smtClean="0"/>
-              <a:t>14-04-2023</a:t>
+              <a:t>19-04-2023</a:t>
             </a:fld>
             <a:endParaRPr lang="es-CL"/>
           </a:p>
@@ -1835,7 +1835,7 @@
           <a:p>
             <a:fld id="{2D727D75-242A-4893-BFA0-CDF26EA27425}" type="datetimeFigureOut">
               <a:rPr lang="es-CL" smtClean="0"/>
-              <a:t>14-04-2023</a:t>
+              <a:t>19-04-2023</a:t>
             </a:fld>
             <a:endParaRPr lang="es-CL"/>
           </a:p>
@@ -1977,7 +1977,7 @@
           <a:p>
             <a:fld id="{2D727D75-242A-4893-BFA0-CDF26EA27425}" type="datetimeFigureOut">
               <a:rPr lang="es-CL" smtClean="0"/>
-              <a:t>14-04-2023</a:t>
+              <a:t>19-04-2023</a:t>
             </a:fld>
             <a:endParaRPr lang="es-CL"/>
           </a:p>
@@ -2090,7 +2090,7 @@
           <a:p>
             <a:fld id="{2D727D75-242A-4893-BFA0-CDF26EA27425}" type="datetimeFigureOut">
               <a:rPr lang="es-CL" smtClean="0"/>
-              <a:t>14-04-2023</a:t>
+              <a:t>19-04-2023</a:t>
             </a:fld>
             <a:endParaRPr lang="es-CL"/>
           </a:p>
@@ -2403,7 +2403,7 @@
           <a:p>
             <a:fld id="{2D727D75-242A-4893-BFA0-CDF26EA27425}" type="datetimeFigureOut">
               <a:rPr lang="es-CL" smtClean="0"/>
-              <a:t>14-04-2023</a:t>
+              <a:t>19-04-2023</a:t>
             </a:fld>
             <a:endParaRPr lang="es-CL"/>
           </a:p>
@@ -2692,7 +2692,7 @@
           <a:p>
             <a:fld id="{2D727D75-242A-4893-BFA0-CDF26EA27425}" type="datetimeFigureOut">
               <a:rPr lang="es-CL" smtClean="0"/>
-              <a:t>14-04-2023</a:t>
+              <a:t>19-04-2023</a:t>
             </a:fld>
             <a:endParaRPr lang="es-CL"/>
           </a:p>
@@ -2935,7 +2935,7 @@
           <a:p>
             <a:fld id="{2D727D75-242A-4893-BFA0-CDF26EA27425}" type="datetimeFigureOut">
               <a:rPr lang="es-CL" smtClean="0"/>
-              <a:t>14-04-2023</a:t>
+              <a:t>19-04-2023</a:t>
             </a:fld>
             <a:endParaRPr lang="es-CL"/>
           </a:p>
@@ -6701,10 +6701,10 @@
                 </a:effectLst>
                 <a:latin typeface="+mj-lt"/>
               </a:rPr>
-              <a:t>XXXX </a:t>
-            </a:r>
-            <a:r>
-              <a:rPr lang="es-CL" sz="2000" dirty="0" err="1">
+              <a:t>0000 0000 </a:t>
+            </a:r>
+            <a:r>
+              <a:rPr lang="es-CL" sz="2000" dirty="0">
                 <a:ln w="0"/>
                 <a:solidFill>
                   <a:schemeClr val="bg1">
@@ -6712,15 +6712,15 @@
                   </a:schemeClr>
                 </a:solidFill>
                 <a:effectLst>
-                  <a:outerShdw blurRad="38100" dist="19050" dir="2700000" algn="tl" rotWithShape="0">
-                    <a:schemeClr val="dk1">
-                      <a:alpha val="40000"/>
-                    </a:schemeClr>
+                  <a:outerShdw blurRad="38100" dist="38100" dir="2700000" algn="tl">
+                    <a:srgbClr val="000000">
+                      <a:alpha val="43137"/>
+                    </a:srgbClr>
                   </a:outerShdw>
                 </a:effectLst>
                 <a:latin typeface="+mj-lt"/>
               </a:rPr>
-              <a:t>XXXX</a:t>
+              <a:t>0000</a:t>
             </a:r>
             <a:r>
               <a:rPr lang="es-CL" sz="2000" dirty="0">
@@ -6739,81 +6739,8 @@
                 </a:effectLst>
                 <a:latin typeface="+mj-lt"/>
               </a:rPr>
-              <a:t> </a:t>
-            </a:r>
-            <a:r>
-              <a:rPr lang="es-CL" sz="2000" dirty="0" err="1">
-                <a:ln w="0"/>
-                <a:solidFill>
-                  <a:schemeClr val="bg1">
-                    <a:lumMod val="65000"/>
-                  </a:schemeClr>
-                </a:solidFill>
-                <a:effectLst>
-                  <a:outerShdw blurRad="38100" dist="38100" dir="2700000" algn="tl">
-                    <a:srgbClr val="000000">
-                      <a:alpha val="43137"/>
-                    </a:srgbClr>
-                  </a:outerShdw>
-                </a:effectLst>
-                <a:latin typeface="+mj-lt"/>
-              </a:rPr>
-              <a:t>XXXX</a:t>
-            </a:r>
-            <a:r>
-              <a:rPr lang="es-CL" sz="2000" dirty="0">
-                <a:ln w="0"/>
-                <a:solidFill>
-                  <a:schemeClr val="bg1">
-                    <a:lumMod val="65000"/>
-                  </a:schemeClr>
-                </a:solidFill>
-                <a:effectLst>
-                  <a:outerShdw blurRad="38100" dist="19050" dir="2700000" algn="tl" rotWithShape="0">
-                    <a:schemeClr val="dk1">
-                      <a:alpha val="40000"/>
-                    </a:schemeClr>
-                  </a:outerShdw>
-                </a:effectLst>
-                <a:latin typeface="+mj-lt"/>
-              </a:rPr>
-              <a:t> </a:t>
-            </a:r>
-            <a:r>
-              <a:rPr lang="es-CL" sz="2000" dirty="0" err="1">
-                <a:ln w="0"/>
-                <a:solidFill>
-                  <a:schemeClr val="bg1">
-                    <a:lumMod val="65000"/>
-                  </a:schemeClr>
-                </a:solidFill>
-                <a:effectLst>
-                  <a:outerShdw blurRad="38100" dist="19050" dir="2700000" algn="tl" rotWithShape="0">
-                    <a:schemeClr val="dk1">
-                      <a:alpha val="40000"/>
-                    </a:schemeClr>
-                  </a:outerShdw>
-                </a:effectLst>
-                <a:latin typeface="+mj-lt"/>
-              </a:rPr>
-              <a:t>XXXX</a:t>
-            </a:r>
-            <a:endParaRPr lang="es-CL" sz="2000" dirty="0">
-              <a:ln w="0"/>
-              <a:solidFill>
-                <a:schemeClr val="bg1">
-                  <a:lumMod val="65000"/>
-                </a:schemeClr>
-              </a:solidFill>
-              <a:effectLst>
-                <a:outerShdw blurRad="38100" dist="19050" dir="2700000" algn="tl" rotWithShape="0">
-                  <a:schemeClr val="dk1">
-                    <a:alpha val="40000"/>
-                  </a:schemeClr>
-                </a:outerShdw>
-              </a:effectLst>
-              <a:latin typeface="+mj-lt"/>
-            </a:endParaRPr>
+              <a:t> 0000</a:t>
+            </a:r>
           </a:p>
         </p:txBody>
       </p:sp>

</xml_diff>